<commit_message>
remove content to reduce time and improve prediction slides
</commit_message>
<xml_diff>
--- a/fmx_2015.16x9.pptx
+++ b/fmx_2015.16x9.pptx
@@ -5,7 +5,7 @@
     <p:sldMasterId id="2147483648" r:id="rId1"/>
   </p:sldMasterIdLst>
   <p:notesMasterIdLst>
-    <p:notesMasterId r:id="rId19"/>
+    <p:notesMasterId r:id="rId18"/>
   </p:notesMasterIdLst>
   <p:sldIdLst>
     <p:sldId id="257" r:id="rId2"/>
@@ -15,16 +15,15 @@
     <p:sldId id="275" r:id="rId6"/>
     <p:sldId id="268" r:id="rId7"/>
     <p:sldId id="258" r:id="rId8"/>
-    <p:sldId id="261" r:id="rId9"/>
-    <p:sldId id="260" r:id="rId10"/>
-    <p:sldId id="262" r:id="rId11"/>
-    <p:sldId id="259" r:id="rId12"/>
-    <p:sldId id="278" r:id="rId13"/>
-    <p:sldId id="263" r:id="rId14"/>
-    <p:sldId id="265" r:id="rId15"/>
-    <p:sldId id="266" r:id="rId16"/>
-    <p:sldId id="274" r:id="rId17"/>
-    <p:sldId id="270" r:id="rId18"/>
+    <p:sldId id="260" r:id="rId9"/>
+    <p:sldId id="262" r:id="rId10"/>
+    <p:sldId id="259" r:id="rId11"/>
+    <p:sldId id="263" r:id="rId12"/>
+    <p:sldId id="265" r:id="rId13"/>
+    <p:sldId id="266" r:id="rId14"/>
+    <p:sldId id="279" r:id="rId15"/>
+    <p:sldId id="274" r:id="rId16"/>
+    <p:sldId id="270" r:id="rId17"/>
   </p:sldIdLst>
   <p:sldSz cx="9144000" cy="5143500" type="screen16x9"/>
   <p:notesSz cx="6858000" cy="9144000"/>
@@ -135,14 +134,13 @@
             <p14:sldId id="275"/>
             <p14:sldId id="268"/>
             <p14:sldId id="258"/>
-            <p14:sldId id="261"/>
             <p14:sldId id="260"/>
             <p14:sldId id="262"/>
             <p14:sldId id="259"/>
-            <p14:sldId id="278"/>
             <p14:sldId id="263"/>
             <p14:sldId id="265"/>
             <p14:sldId id="266"/>
+            <p14:sldId id="279"/>
             <p14:sldId id="274"/>
             <p14:sldId id="270"/>
           </p14:sldIdLst>
@@ -680,7 +678,7 @@
           <a:p>
             <a:fld id="{E9B2779C-508E-8444-A7D4-4A51A98516D1}" type="slidenum">
               <a:rPr lang="en-US" smtClean="0"/>
-              <a:t>10</a:t>
+              <a:t>9</a:t>
             </a:fld>
             <a:endParaRPr lang="en-US"/>
           </a:p>
@@ -790,7 +788,7 @@
           <a:p>
             <a:fld id="{E9B2779C-508E-8444-A7D4-4A51A98516D1}" type="slidenum">
               <a:rPr lang="en-US" smtClean="0"/>
-              <a:t>11</a:t>
+              <a:t>10</a:t>
             </a:fld>
             <a:endParaRPr lang="en-US"/>
           </a:p>
@@ -972,7 +970,7 @@
           <a:p>
             <a:fld id="{8BE62C9E-E039-1D4B-B0DD-27D2F5375E2F}" type="slidenum">
               <a:rPr lang="en-US" smtClean="0"/>
-              <a:t>14</a:t>
+              <a:t>12</a:t>
             </a:fld>
             <a:endParaRPr lang="en-US"/>
           </a:p>
@@ -4018,7 +4016,7 @@
         <p:spPr>
           <a:xfrm>
             <a:off x="0" y="4774168"/>
-            <a:ext cx="2419277" cy="369332"/>
+            <a:ext cx="2187994" cy="369332"/>
           </a:xfrm>
           <a:prstGeom prst="rect">
             <a:avLst/>
@@ -4039,7 +4037,17 @@
                   </a:schemeClr>
                 </a:solidFill>
               </a:rPr>
-              <a:t>Image from </a:t>
+              <a:t>Image </a:t>
+            </a:r>
+            <a:r>
+              <a:rPr lang="en-US" dirty="0" smtClean="0">
+                <a:solidFill>
+                  <a:schemeClr val="bg2">
+                    <a:lumMod val="50000"/>
+                  </a:schemeClr>
+                </a:solidFill>
+              </a:rPr>
+              <a:t>by </a:t>
             </a:r>
             <a:r>
               <a:rPr lang="en-US" dirty="0" err="1" smtClean="0">
@@ -4115,336 +4123,6 @@
           <a:p>
             <a:r>
               <a:rPr lang="en-US" dirty="0" smtClean="0"/>
-              <a:t>Customer Segmentation</a:t>
-            </a:r>
-            <a:endParaRPr lang="en-US" dirty="0"/>
-          </a:p>
-        </p:txBody>
-      </p:sp>
-      <p:graphicFrame>
-        <p:nvGraphicFramePr>
-          <p:cNvPr id="4" name="Content Placeholder 3"/>
-          <p:cNvGraphicFramePr>
-            <a:graphicFrameLocks noGrp="1"/>
-          </p:cNvGraphicFramePr>
-          <p:nvPr>
-            <p:ph idx="1"/>
-            <p:extLst>
-              <p:ext uri="{D42A27DB-BD31-4B8C-83A1-F6EECF244321}">
-                <p14:modId xmlns:p14="http://schemas.microsoft.com/office/powerpoint/2010/main" val="1772609956"/>
-              </p:ext>
-            </p:extLst>
-          </p:nvPr>
-        </p:nvGraphicFramePr>
-        <p:xfrm>
-          <a:off x="457200" y="1200148"/>
-          <a:ext cx="8229600" cy="3483681"/>
-        </p:xfrm>
-        <a:graphic>
-          <a:graphicData uri="http://schemas.openxmlformats.org/drawingml/2006/table">
-            <a:tbl>
-              <a:tblPr firstRow="1" bandRow="1">
-                <a:tableStyleId>{5C22544A-7EE6-4342-B048-85BDC9FD1C3A}</a:tableStyleId>
-              </a:tblPr>
-              <a:tblGrid>
-                <a:gridCol w="2743200"/>
-                <a:gridCol w="2743200"/>
-                <a:gridCol w="2743200"/>
-              </a:tblGrid>
-              <a:tr h="1101761">
-                <a:tc>
-                  <a:txBody>
-                    <a:bodyPr/>
-                    <a:lstStyle/>
-                    <a:p>
-                      <a:r>
-                        <a:rPr lang="en-US" sz="2400" dirty="0" smtClean="0"/>
-                        <a:t>Price Insensitive</a:t>
-                      </a:r>
-                      <a:endParaRPr lang="en-US" sz="2400" baseline="0" dirty="0" smtClean="0"/>
-                    </a:p>
-                    <a:p>
-                      <a:r>
-                        <a:rPr lang="en-US" baseline="0" dirty="0" smtClean="0"/>
-                        <a:t>AAA Gamer</a:t>
-                      </a:r>
-                      <a:endParaRPr lang="en-US" dirty="0"/>
-                    </a:p>
-                  </a:txBody>
-                  <a:tcPr/>
-                </a:tc>
-                <a:tc>
-                  <a:txBody>
-                    <a:bodyPr/>
-                    <a:lstStyle/>
-                    <a:p>
-                      <a:r>
-                        <a:rPr lang="en-US" sz="2400" baseline="0" dirty="0" smtClean="0"/>
-                        <a:t>Hardware: +$2000</a:t>
-                      </a:r>
-                    </a:p>
-                    <a:p>
-                      <a:r>
-                        <a:rPr lang="en-US" baseline="0" dirty="0" smtClean="0"/>
-                        <a:t>Hi wattage video cards</a:t>
-                      </a:r>
-                    </a:p>
-                    <a:p>
-                      <a:r>
-                        <a:rPr lang="en-US" baseline="0" dirty="0" smtClean="0"/>
-                        <a:t>Hi cost gaming computer</a:t>
-                      </a:r>
-                      <a:endParaRPr lang="en-US" dirty="0"/>
-                    </a:p>
-                  </a:txBody>
-                  <a:tcPr/>
-                </a:tc>
-                <a:tc>
-                  <a:txBody>
-                    <a:bodyPr/>
-                    <a:lstStyle/>
-                    <a:p>
-                      <a:r>
-                        <a:rPr lang="en-US" sz="2400" dirty="0" smtClean="0"/>
-                        <a:t>Games: $50+</a:t>
-                      </a:r>
-                      <a:endParaRPr lang="en-US" sz="2400" baseline="0" dirty="0" smtClean="0"/>
-                    </a:p>
-                    <a:p>
-                      <a:r>
-                        <a:rPr lang="en-US" baseline="0" dirty="0" smtClean="0"/>
-                        <a:t>Best graphical fidelity</a:t>
-                      </a:r>
-                    </a:p>
-                    <a:p>
-                      <a:r>
-                        <a:rPr lang="en-US" baseline="0" dirty="0" smtClean="0"/>
-                        <a:t>100s to choose from</a:t>
-                      </a:r>
-                      <a:endParaRPr lang="en-US" dirty="0"/>
-                    </a:p>
-                  </a:txBody>
-                  <a:tcPr/>
-                </a:tc>
-              </a:tr>
-              <a:tr h="1101761">
-                <a:tc>
-                  <a:txBody>
-                    <a:bodyPr/>
-                    <a:lstStyle/>
-                    <a:p>
-                      <a:r>
-                        <a:rPr lang="en-US" sz="2400" dirty="0" smtClean="0"/>
-                        <a:t>Price Sensitive</a:t>
-                      </a:r>
-                    </a:p>
-                    <a:p>
-                      <a:r>
-                        <a:rPr lang="en-US" dirty="0" smtClean="0"/>
-                        <a:t>AAA</a:t>
-                      </a:r>
-                      <a:r>
-                        <a:rPr lang="en-US" baseline="0" dirty="0" smtClean="0"/>
-                        <a:t> Gamer</a:t>
-                      </a:r>
-                      <a:endParaRPr lang="en-US" dirty="0"/>
-                    </a:p>
-                  </a:txBody>
-                  <a:tcPr/>
-                </a:tc>
-                <a:tc>
-                  <a:txBody>
-                    <a:bodyPr/>
-                    <a:lstStyle/>
-                    <a:p>
-                      <a:r>
-                        <a:rPr lang="en-US" sz="2400" dirty="0" smtClean="0"/>
-                        <a:t>Hardware: ~$300</a:t>
-                      </a:r>
-                      <a:endParaRPr lang="en-US" sz="1800" dirty="0" smtClean="0"/>
-                    </a:p>
-                    <a:p>
-                      <a:r>
-                        <a:rPr lang="en-US" sz="1800" dirty="0" smtClean="0"/>
-                        <a:t>Power constrained package</a:t>
-                      </a:r>
-                    </a:p>
-                    <a:p>
-                      <a:r>
-                        <a:rPr lang="en-US" sz="1800" dirty="0" smtClean="0"/>
-                        <a:t>Low cost console</a:t>
-                      </a:r>
-                      <a:endParaRPr lang="en-US" sz="2400" dirty="0" smtClean="0"/>
-                    </a:p>
-                  </a:txBody>
-                  <a:tcPr/>
-                </a:tc>
-                <a:tc>
-                  <a:txBody>
-                    <a:bodyPr/>
-                    <a:lstStyle/>
-                    <a:p>
-                      <a:r>
-                        <a:rPr lang="en-US" sz="2400" dirty="0" smtClean="0"/>
-                        <a:t>Games: $50+</a:t>
-                      </a:r>
-                    </a:p>
-                    <a:p>
-                      <a:r>
-                        <a:rPr lang="en-US" dirty="0" smtClean="0"/>
-                        <a:t>Good</a:t>
-                      </a:r>
-                      <a:r>
-                        <a:rPr lang="en-US" baseline="0" dirty="0" smtClean="0"/>
-                        <a:t> graphical fidelity</a:t>
-                      </a:r>
-                    </a:p>
-                    <a:p>
-                      <a:r>
-                        <a:rPr lang="en-US" baseline="0" dirty="0" smtClean="0"/>
-                        <a:t>100s to choose from</a:t>
-                      </a:r>
-                      <a:endParaRPr lang="en-US" dirty="0"/>
-                    </a:p>
-                  </a:txBody>
-                  <a:tcPr/>
-                </a:tc>
-              </a:tr>
-              <a:tr h="1101761">
-                <a:tc>
-                  <a:txBody>
-                    <a:bodyPr/>
-                    <a:lstStyle/>
-                    <a:p>
-                      <a:r>
-                        <a:rPr lang="en-US" sz="2800" dirty="0" smtClean="0"/>
-                        <a:t>Mobile Gamer</a:t>
-                      </a:r>
-                    </a:p>
-                    <a:p>
-                      <a:r>
-                        <a:rPr lang="en-US" dirty="0" smtClean="0"/>
-                        <a:t>Social, casual, innovative</a:t>
-                      </a:r>
-                      <a:endParaRPr lang="en-US" dirty="0"/>
-                    </a:p>
-                  </a:txBody>
-                  <a:tcPr/>
-                </a:tc>
-                <a:tc>
-                  <a:txBody>
-                    <a:bodyPr/>
-                    <a:lstStyle/>
-                    <a:p>
-                      <a:r>
-                        <a:rPr lang="en-US" sz="2400" dirty="0" smtClean="0"/>
-                        <a:t>Hardware: $0 - $800</a:t>
-                      </a:r>
-                    </a:p>
-                    <a:p>
-                      <a:r>
-                        <a:rPr lang="en-US" dirty="0" smtClean="0"/>
-                        <a:t>Low power devices</a:t>
-                      </a:r>
-                    </a:p>
-                    <a:p>
-                      <a:r>
-                        <a:rPr lang="en-US" baseline="0" dirty="0" smtClean="0"/>
-                        <a:t>Prices run low to middle</a:t>
-                      </a:r>
-                      <a:endParaRPr lang="en-US" dirty="0"/>
-                    </a:p>
-                  </a:txBody>
-                  <a:tcPr/>
-                </a:tc>
-                <a:tc>
-                  <a:txBody>
-                    <a:bodyPr/>
-                    <a:lstStyle/>
-                    <a:p>
-                      <a:r>
-                        <a:rPr lang="en-US" sz="2400" dirty="0" smtClean="0"/>
-                        <a:t>Games: $0</a:t>
-                      </a:r>
-                      <a:r>
-                        <a:rPr lang="en-US" sz="2400" baseline="0" dirty="0" smtClean="0"/>
-                        <a:t> - $5</a:t>
-                      </a:r>
-                    </a:p>
-                    <a:p>
-                      <a:r>
-                        <a:rPr lang="en-US" baseline="0" dirty="0" smtClean="0"/>
-                        <a:t>Wants fun, innovation, but not willing to pay much</a:t>
-                      </a:r>
-                    </a:p>
-                    <a:p>
-                      <a:r>
-                        <a:rPr lang="en-US" baseline="0" dirty="0" smtClean="0"/>
-                        <a:t>1000s to choose from</a:t>
-                      </a:r>
-                    </a:p>
-                  </a:txBody>
-                  <a:tcPr/>
-                </a:tc>
-              </a:tr>
-            </a:tbl>
-          </a:graphicData>
-        </a:graphic>
-      </p:graphicFrame>
-    </p:spTree>
-    <p:extLst>
-      <p:ext uri="{BB962C8B-B14F-4D97-AF65-F5344CB8AC3E}">
-        <p14:creationId xmlns:p14="http://schemas.microsoft.com/office/powerpoint/2010/main" val="2301412250"/>
-      </p:ext>
-    </p:extLst>
-  </p:cSld>
-  <p:clrMapOvr>
-    <a:masterClrMapping/>
-  </p:clrMapOvr>
-  <p:timing>
-    <p:tnLst>
-      <p:par>
-        <p:cTn xmlns:p14="http://schemas.microsoft.com/office/powerpoint/2010/main" id="1" dur="indefinite" restart="never" nodeType="tmRoot"/>
-      </p:par>
-    </p:tnLst>
-  </p:timing>
-</p:sld>
-</file>
-
-<file path=ppt/slides/slide11.xml><?xml version="1.0" encoding="utf-8"?>
-<p:sld xmlns:a="http://schemas.openxmlformats.org/drawingml/2006/main" xmlns:r="http://schemas.openxmlformats.org/officeDocument/2006/relationships" xmlns:p="http://schemas.openxmlformats.org/presentationml/2006/main">
-  <p:cSld>
-    <p:spTree>
-      <p:nvGrpSpPr>
-        <p:cNvPr id="1" name=""/>
-        <p:cNvGrpSpPr/>
-        <p:nvPr/>
-      </p:nvGrpSpPr>
-      <p:grpSpPr>
-        <a:xfrm>
-          <a:off x="0" y="0"/>
-          <a:ext cx="0" cy="0"/>
-          <a:chOff x="0" y="0"/>
-          <a:chExt cx="0" cy="0"/>
-        </a:xfrm>
-      </p:grpSpPr>
-      <p:sp>
-        <p:nvSpPr>
-          <p:cNvPr id="2" name="Title 1"/>
-          <p:cNvSpPr>
-            <a:spLocks noGrp="1"/>
-          </p:cNvSpPr>
-          <p:nvPr>
-            <p:ph type="title"/>
-          </p:nvPr>
-        </p:nvSpPr>
-        <p:spPr/>
-        <p:txBody>
-          <a:bodyPr/>
-          <a:lstStyle/>
-          <a:p>
-            <a:r>
-              <a:rPr lang="en-US" dirty="0" smtClean="0"/>
               <a:t>Innovation</a:t>
             </a:r>
             <a:endParaRPr lang="en-US" dirty="0"/>
@@ -4496,185 +4174,7 @@
 </p:sld>
 </file>
 
-<file path=ppt/slides/slide12.xml><?xml version="1.0" encoding="utf-8"?>
-<p:sld xmlns:a="http://schemas.openxmlformats.org/drawingml/2006/main" xmlns:r="http://schemas.openxmlformats.org/officeDocument/2006/relationships" xmlns:p="http://schemas.openxmlformats.org/presentationml/2006/main">
-  <p:cSld>
-    <p:spTree>
-      <p:nvGrpSpPr>
-        <p:cNvPr id="1" name=""/>
-        <p:cNvGrpSpPr/>
-        <p:nvPr/>
-      </p:nvGrpSpPr>
-      <p:grpSpPr>
-        <a:xfrm>
-          <a:off x="0" y="0"/>
-          <a:ext cx="0" cy="0"/>
-          <a:chOff x="0" y="0"/>
-          <a:chExt cx="0" cy="0"/>
-        </a:xfrm>
-      </p:grpSpPr>
-      <p:sp>
-        <p:nvSpPr>
-          <p:cNvPr id="2" name="Title 1"/>
-          <p:cNvSpPr>
-            <a:spLocks noGrp="1"/>
-          </p:cNvSpPr>
-          <p:nvPr>
-            <p:ph type="title"/>
-          </p:nvPr>
-        </p:nvSpPr>
-        <p:spPr/>
-        <p:txBody>
-          <a:bodyPr/>
-          <a:lstStyle/>
-          <a:p>
-            <a:r>
-              <a:rPr lang="en-US" dirty="0" smtClean="0"/>
-              <a:t>The world according to Bob </a:t>
-            </a:r>
-            <a:r>
-              <a:rPr lang="en-US" dirty="0" err="1" smtClean="0"/>
-              <a:t>Lefsetz</a:t>
-            </a:r>
-            <a:endParaRPr lang="en-US" dirty="0"/>
-          </a:p>
-        </p:txBody>
-      </p:sp>
-      <p:sp>
-        <p:nvSpPr>
-          <p:cNvPr id="3" name="Content Placeholder 2"/>
-          <p:cNvSpPr>
-            <a:spLocks noGrp="1"/>
-          </p:cNvSpPr>
-          <p:nvPr>
-            <p:ph idx="1"/>
-          </p:nvPr>
-        </p:nvSpPr>
-        <p:spPr/>
-        <p:txBody>
-          <a:bodyPr>
-            <a:normAutofit/>
-          </a:bodyPr>
-          <a:lstStyle/>
-          <a:p>
-            <a:pPr marL="0" indent="0">
-              <a:buNone/>
-            </a:pPr>
-            <a:r>
-              <a:rPr lang="en-US" sz="2000" dirty="0"/>
-              <a:t>Nobody wants to watch the Discovery Channel. 2.9 million people viewed “Naked and Afraid.” But a hundred million paid for it. More than a buck a month. The CEO made $156 million. Now what</a:t>
-            </a:r>
-            <a:r>
-              <a:rPr lang="en-US" sz="2000" dirty="0" smtClean="0"/>
-              <a:t>?</a:t>
-            </a:r>
-          </a:p>
-          <a:p>
-            <a:pPr marL="0" indent="0">
-              <a:buNone/>
-            </a:pPr>
-            <a:endParaRPr lang="en-US" sz="2000" dirty="0"/>
-          </a:p>
-          <a:p>
-            <a:pPr marL="0" indent="0">
-              <a:buNone/>
-            </a:pPr>
-            <a:r>
-              <a:rPr lang="en-US" sz="2000" dirty="0" smtClean="0"/>
-              <a:t>Lawsuits</a:t>
-            </a:r>
-            <a:r>
-              <a:rPr lang="en-US" sz="2000" dirty="0"/>
-              <a:t>.</a:t>
-            </a:r>
-          </a:p>
-          <a:p>
-            <a:pPr marL="0" indent="0">
-              <a:buNone/>
-            </a:pPr>
-            <a:endParaRPr lang="en-US" sz="2000" dirty="0" smtClean="0"/>
-          </a:p>
-          <a:p>
-            <a:pPr marL="0" indent="0">
-              <a:buNone/>
-            </a:pPr>
-            <a:r>
-              <a:rPr lang="en-US" sz="2000" dirty="0"/>
-              <a:t>Piracy is disruptive, sure it’s theft, but it breaks the logjam. You might be bitching you’re making less money on recorded music, but you’re simultaneously complaining about your cable bill.</a:t>
-            </a:r>
-          </a:p>
-          <a:p>
-            <a:pPr marL="0" indent="0">
-              <a:buNone/>
-            </a:pPr>
-            <a:endParaRPr lang="en-US" dirty="0"/>
-          </a:p>
-        </p:txBody>
-      </p:sp>
-      <p:sp>
-        <p:nvSpPr>
-          <p:cNvPr id="4" name="TextBox 3"/>
-          <p:cNvSpPr txBox="1"/>
-          <p:nvPr/>
-        </p:nvSpPr>
-        <p:spPr>
-          <a:xfrm>
-            <a:off x="457200" y="4728498"/>
-            <a:ext cx="6283917" cy="369332"/>
-          </a:xfrm>
-          <a:prstGeom prst="rect">
-            <a:avLst/>
-          </a:prstGeom>
-          <a:noFill/>
-        </p:spPr>
-        <p:txBody>
-          <a:bodyPr wrap="none" rtlCol="0">
-            <a:spAutoFit/>
-          </a:bodyPr>
-          <a:lstStyle/>
-          <a:p>
-            <a:r>
-              <a:rPr lang="en-US" dirty="0" smtClean="0"/>
-              <a:t>Subscribe here</a:t>
-            </a:r>
-            <a:r>
-              <a:rPr lang="en-US" dirty="0"/>
-              <a:t>: http://</a:t>
-            </a:r>
-            <a:r>
-              <a:rPr lang="en-US" dirty="0" err="1"/>
-              <a:t>www.lefsetz.com</a:t>
-            </a:r>
-            <a:r>
-              <a:rPr lang="en-US" dirty="0"/>
-              <a:t>/lists/?p=</a:t>
-            </a:r>
-            <a:r>
-              <a:rPr lang="en-US" dirty="0" err="1"/>
-              <a:t>subscribe&amp;id</a:t>
-            </a:r>
-            <a:r>
-              <a:rPr lang="en-US" dirty="0"/>
-              <a:t>=1</a:t>
-            </a:r>
-            <a:endParaRPr lang="en-US" dirty="0" smtClean="0"/>
-          </a:p>
-        </p:txBody>
-      </p:sp>
-    </p:spTree>
-    <p:extLst>
-      <p:ext uri="{BB962C8B-B14F-4D97-AF65-F5344CB8AC3E}">
-        <p14:creationId xmlns:p14="http://schemas.microsoft.com/office/powerpoint/2010/main" val="3242683277"/>
-      </p:ext>
-    </p:extLst>
-  </p:cSld>
-  <p:clrMapOvr>
-    <a:masterClrMapping/>
-  </p:clrMapOvr>
-</p:sld>
-</file>
-
-<file path=ppt/slides/slide13.xml><?xml version="1.0" encoding="utf-8"?>
+<file path=ppt/slides/slide11.xml><?xml version="1.0" encoding="utf-8"?>
 <p:sld xmlns:a="http://schemas.openxmlformats.org/drawingml/2006/main" xmlns:r="http://schemas.openxmlformats.org/officeDocument/2006/relationships" xmlns:p="http://schemas.openxmlformats.org/presentationml/2006/main">
   <p:cSld>
     <p:spTree>
@@ -4793,7 +4293,7 @@
 </p:sld>
 </file>
 
-<file path=ppt/slides/slide14.xml><?xml version="1.0" encoding="utf-8"?>
+<file path=ppt/slides/slide12.xml><?xml version="1.0" encoding="utf-8"?>
 <p:sld xmlns:a="http://schemas.openxmlformats.org/drawingml/2006/main" xmlns:r="http://schemas.openxmlformats.org/officeDocument/2006/relationships" xmlns:p="http://schemas.openxmlformats.org/presentationml/2006/main">
   <p:cSld>
     <p:spTree>
@@ -5001,6 +4501,275 @@
 </p:sld>
 </file>
 
+<file path=ppt/slides/slide13.xml><?xml version="1.0" encoding="utf-8"?>
+<p:sld xmlns:a="http://schemas.openxmlformats.org/drawingml/2006/main" xmlns:r="http://schemas.openxmlformats.org/officeDocument/2006/relationships" xmlns:p="http://schemas.openxmlformats.org/presentationml/2006/main">
+  <p:cSld>
+    <p:spTree>
+      <p:nvGrpSpPr>
+        <p:cNvPr id="1" name=""/>
+        <p:cNvGrpSpPr/>
+        <p:nvPr/>
+      </p:nvGrpSpPr>
+      <p:grpSpPr>
+        <a:xfrm>
+          <a:off x="0" y="0"/>
+          <a:ext cx="0" cy="0"/>
+          <a:chOff x="0" y="0"/>
+          <a:chExt cx="0" cy="0"/>
+        </a:xfrm>
+      </p:grpSpPr>
+      <p:sp>
+        <p:nvSpPr>
+          <p:cNvPr id="2" name="Title 1"/>
+          <p:cNvSpPr>
+            <a:spLocks noGrp="1"/>
+          </p:cNvSpPr>
+          <p:nvPr>
+            <p:ph type="title"/>
+          </p:nvPr>
+        </p:nvSpPr>
+        <p:spPr/>
+        <p:txBody>
+          <a:bodyPr>
+            <a:normAutofit/>
+          </a:bodyPr>
+          <a:lstStyle/>
+          <a:p>
+            <a:r>
+              <a:rPr lang="en-US" dirty="0" smtClean="0"/>
+              <a:t>Predictions</a:t>
+            </a:r>
+            <a:endParaRPr lang="en-US" dirty="0"/>
+          </a:p>
+        </p:txBody>
+      </p:sp>
+      <p:sp>
+        <p:nvSpPr>
+          <p:cNvPr id="3" name="Content Placeholder 2"/>
+          <p:cNvSpPr>
+            <a:spLocks noGrp="1"/>
+          </p:cNvSpPr>
+          <p:nvPr>
+            <p:ph idx="1"/>
+          </p:nvPr>
+        </p:nvSpPr>
+        <p:spPr>
+          <a:xfrm>
+            <a:off x="457200" y="1200150"/>
+            <a:ext cx="7767562" cy="3613755"/>
+          </a:xfrm>
+        </p:spPr>
+        <p:txBody>
+          <a:bodyPr>
+            <a:normAutofit/>
+          </a:bodyPr>
+          <a:lstStyle/>
+          <a:p>
+            <a:r>
+              <a:rPr lang="en-US" dirty="0" smtClean="0"/>
+              <a:t>Game risk looks more like Movie risk</a:t>
+            </a:r>
+          </a:p>
+          <a:p>
+            <a:endParaRPr lang="en-US" sz="800" dirty="0" smtClean="0"/>
+          </a:p>
+          <a:p>
+            <a:r>
+              <a:rPr lang="en-US" dirty="0" smtClean="0"/>
+              <a:t>Development tools move to the cloud</a:t>
+            </a:r>
+          </a:p>
+          <a:p>
+            <a:endParaRPr lang="en-US" sz="800" dirty="0" smtClean="0"/>
+          </a:p>
+          <a:p>
+            <a:r>
+              <a:rPr lang="en-US" dirty="0" smtClean="0"/>
+              <a:t>Tune </a:t>
+            </a:r>
+            <a:r>
+              <a:rPr lang="en-US" dirty="0" smtClean="0"/>
+              <a:t>after </a:t>
+            </a:r>
+            <a:r>
+              <a:rPr lang="en-US" dirty="0" smtClean="0"/>
+              <a:t>Shipping</a:t>
+            </a:r>
+          </a:p>
+          <a:p>
+            <a:endParaRPr lang="en-US" sz="800" dirty="0" smtClean="0"/>
+          </a:p>
+          <a:p>
+            <a:r>
+              <a:rPr lang="en-US" dirty="0" smtClean="0"/>
+              <a:t>The end of </a:t>
+            </a:r>
+            <a:r>
+              <a:rPr lang="en-US" dirty="0" smtClean="0"/>
+              <a:t>DRM</a:t>
+            </a:r>
+            <a:endParaRPr lang="en-US" sz="1050" dirty="0"/>
+          </a:p>
+          <a:p>
+            <a:endParaRPr lang="en-US" sz="1050" dirty="0" smtClean="0"/>
+          </a:p>
+          <a:p>
+            <a:r>
+              <a:rPr lang="en-US" dirty="0" smtClean="0"/>
+              <a:t>Rethink of the end devices we use</a:t>
+            </a:r>
+            <a:endParaRPr lang="en-US" dirty="0"/>
+          </a:p>
+        </p:txBody>
+      </p:sp>
+    </p:spTree>
+    <p:extLst>
+      <p:ext uri="{BB962C8B-B14F-4D97-AF65-F5344CB8AC3E}">
+        <p14:creationId xmlns:p14="http://schemas.microsoft.com/office/powerpoint/2010/main" val="4003193400"/>
+      </p:ext>
+    </p:extLst>
+  </p:cSld>
+  <p:clrMapOvr>
+    <a:masterClrMapping/>
+  </p:clrMapOvr>
+  <p:timing>
+    <p:tnLst>
+      <p:par>
+        <p:cTn xmlns:p14="http://schemas.microsoft.com/office/powerpoint/2010/main" id="1" dur="indefinite" restart="never" nodeType="tmRoot"/>
+      </p:par>
+    </p:tnLst>
+  </p:timing>
+</p:sld>
+</file>
+
+<file path=ppt/slides/slide14.xml><?xml version="1.0" encoding="utf-8"?>
+<p:sld xmlns:a="http://schemas.openxmlformats.org/drawingml/2006/main" xmlns:r="http://schemas.openxmlformats.org/officeDocument/2006/relationships" xmlns:p="http://schemas.openxmlformats.org/presentationml/2006/main">
+  <p:cSld>
+    <p:spTree>
+      <p:nvGrpSpPr>
+        <p:cNvPr id="1" name=""/>
+        <p:cNvGrpSpPr/>
+        <p:nvPr/>
+      </p:nvGrpSpPr>
+      <p:grpSpPr>
+        <a:xfrm>
+          <a:off x="0" y="0"/>
+          <a:ext cx="0" cy="0"/>
+          <a:chOff x="0" y="0"/>
+          <a:chExt cx="0" cy="0"/>
+        </a:xfrm>
+      </p:grpSpPr>
+      <p:sp>
+        <p:nvSpPr>
+          <p:cNvPr id="2" name="Title 1"/>
+          <p:cNvSpPr>
+            <a:spLocks noGrp="1"/>
+          </p:cNvSpPr>
+          <p:nvPr>
+            <p:ph type="title"/>
+          </p:nvPr>
+        </p:nvSpPr>
+        <p:spPr/>
+        <p:txBody>
+          <a:bodyPr/>
+          <a:lstStyle/>
+          <a:p>
+            <a:r>
+              <a:rPr lang="en-US" dirty="0" smtClean="0"/>
+              <a:t>Predictions</a:t>
+            </a:r>
+            <a:endParaRPr lang="en-US" dirty="0"/>
+          </a:p>
+        </p:txBody>
+      </p:sp>
+      <p:sp>
+        <p:nvSpPr>
+          <p:cNvPr id="3" name="Content Placeholder 2"/>
+          <p:cNvSpPr>
+            <a:spLocks noGrp="1"/>
+          </p:cNvSpPr>
+          <p:nvPr>
+            <p:ph idx="1"/>
+          </p:nvPr>
+        </p:nvSpPr>
+        <p:spPr/>
+        <p:txBody>
+          <a:bodyPr>
+            <a:normAutofit lnSpcReduction="10000"/>
+          </a:bodyPr>
+          <a:lstStyle/>
+          <a:p>
+            <a:r>
+              <a:rPr lang="en-US" dirty="0"/>
+              <a:t>Bidirectional communication </a:t>
+            </a:r>
+            <a:r>
+              <a:rPr lang="en-US" dirty="0" smtClean="0"/>
+              <a:t>everywhere</a:t>
+            </a:r>
+          </a:p>
+          <a:p>
+            <a:endParaRPr lang="en-US" sz="900" dirty="0" smtClean="0"/>
+          </a:p>
+          <a:p>
+            <a:r>
+              <a:rPr lang="en-US" dirty="0" smtClean="0"/>
+              <a:t>New competition in communications</a:t>
+            </a:r>
+          </a:p>
+          <a:p>
+            <a:endParaRPr lang="en-US" sz="900" dirty="0"/>
+          </a:p>
+          <a:p>
+            <a:r>
+              <a:rPr lang="en-US" dirty="0" smtClean="0"/>
+              <a:t>Rethink </a:t>
+            </a:r>
+            <a:r>
+              <a:rPr lang="en-US" dirty="0"/>
+              <a:t>CDN </a:t>
+            </a:r>
+            <a:r>
+              <a:rPr lang="en-US" dirty="0" smtClean="0"/>
+              <a:t>&amp; Distribution Strategies</a:t>
+            </a:r>
+          </a:p>
+          <a:p>
+            <a:endParaRPr lang="en-US" sz="800" dirty="0" smtClean="0"/>
+          </a:p>
+          <a:p>
+            <a:r>
+              <a:rPr lang="en-US" dirty="0" smtClean="0"/>
+              <a:t>Rethink Geo-fencing and audience sizing</a:t>
+            </a:r>
+          </a:p>
+          <a:p>
+            <a:endParaRPr lang="en-US" sz="800" dirty="0"/>
+          </a:p>
+          <a:p>
+            <a:r>
+              <a:rPr lang="en-US" dirty="0" smtClean="0"/>
+              <a:t>Massive upheaval in all media distribution</a:t>
+            </a:r>
+          </a:p>
+          <a:p>
+            <a:endParaRPr lang="en-US" dirty="0"/>
+          </a:p>
+        </p:txBody>
+      </p:sp>
+    </p:spTree>
+    <p:extLst>
+      <p:ext uri="{BB962C8B-B14F-4D97-AF65-F5344CB8AC3E}">
+        <p14:creationId xmlns:p14="http://schemas.microsoft.com/office/powerpoint/2010/main" val="2761789121"/>
+      </p:ext>
+    </p:extLst>
+  </p:cSld>
+  <p:clrMapOvr>
+    <a:masterClrMapping/>
+  </p:clrMapOvr>
+</p:sld>
+</file>
+
 <file path=ppt/slides/slide15.xml><?xml version="1.0" encoding="utf-8"?>
 <p:sld xmlns:a="http://schemas.openxmlformats.org/drawingml/2006/main" xmlns:r="http://schemas.openxmlformats.org/officeDocument/2006/relationships" xmlns:p="http://schemas.openxmlformats.org/presentationml/2006/main">
   <p:cSld>
@@ -5030,14 +4799,12 @@
         </p:nvSpPr>
         <p:spPr/>
         <p:txBody>
-          <a:bodyPr>
-            <a:normAutofit/>
-          </a:bodyPr>
+          <a:bodyPr/>
           <a:lstStyle/>
           <a:p>
             <a:r>
               <a:rPr lang="en-US" dirty="0" smtClean="0"/>
-              <a:t>Ubiquitous Connectivity</a:t>
+              <a:t>Wrapping up</a:t>
             </a:r>
             <a:endParaRPr lang="en-US" dirty="0"/>
           </a:p>
@@ -5053,58 +4820,42 @@
             <p:ph idx="1"/>
           </p:nvPr>
         </p:nvSpPr>
-        <p:spPr>
-          <a:xfrm>
-            <a:off x="457200" y="1200150"/>
-            <a:ext cx="7767562" cy="3613755"/>
-          </a:xfrm>
-        </p:spPr>
-        <p:txBody>
-          <a:bodyPr>
-            <a:normAutofit/>
-          </a:bodyPr>
+        <p:spPr/>
+        <p:txBody>
+          <a:bodyPr/>
           <a:lstStyle/>
           <a:p>
             <a:r>
               <a:rPr lang="en-US" dirty="0" smtClean="0"/>
-              <a:t>Tune after Shipping</a:t>
-            </a:r>
+              <a:t>Really about investment strategies</a:t>
+            </a:r>
+            <a:endParaRPr lang="en-US" dirty="0"/>
+          </a:p>
+          <a:p>
+            <a:endParaRPr lang="en-US" sz="500" dirty="0"/>
           </a:p>
           <a:p>
             <a:r>
               <a:rPr lang="en-US" dirty="0" smtClean="0"/>
-              <a:t>The end of DRM</a:t>
-            </a:r>
-            <a:endParaRPr lang="en-US" dirty="0"/>
-          </a:p>
-          <a:p>
-            <a:pPr lvl="1"/>
-            <a:r>
-              <a:rPr lang="en-US" sz="2400" dirty="0" smtClean="0"/>
-              <a:t>Logic in cloud can’t be stolen</a:t>
-            </a:r>
-          </a:p>
-          <a:p>
-            <a:pPr lvl="1"/>
-            <a:endParaRPr lang="en-US" sz="1050" dirty="0" smtClean="0"/>
+              <a:t>All predictions involve risk</a:t>
+            </a:r>
+          </a:p>
+          <a:p>
+            <a:endParaRPr lang="en-US" sz="400" dirty="0"/>
           </a:p>
           <a:p>
             <a:r>
               <a:rPr lang="en-US" dirty="0" smtClean="0"/>
-              <a:t>Rethink CDN Strategies &amp; fencing</a:t>
-            </a:r>
-            <a:endParaRPr lang="en-US" dirty="0"/>
+              <a:t>Focus on a few that matter</a:t>
+            </a:r>
+          </a:p>
+          <a:p>
+            <a:endParaRPr lang="en-US" sz="600" dirty="0"/>
           </a:p>
           <a:p>
             <a:r>
               <a:rPr lang="en-US" dirty="0" smtClean="0"/>
-              <a:t>Bidirectional communication everywhere</a:t>
-            </a:r>
-          </a:p>
-          <a:p>
-            <a:r>
-              <a:rPr lang="en-US" dirty="0" smtClean="0"/>
-              <a:t>Rethink the way we size our audiences</a:t>
+              <a:t>Collect data as you go, then course correct</a:t>
             </a:r>
           </a:p>
         </p:txBody>
@@ -5112,7 +4863,7 @@
     </p:spTree>
     <p:extLst>
       <p:ext uri="{BB962C8B-B14F-4D97-AF65-F5344CB8AC3E}">
-        <p14:creationId xmlns:p14="http://schemas.microsoft.com/office/powerpoint/2010/main" val="4003193400"/>
+        <p14:creationId xmlns:p14="http://schemas.microsoft.com/office/powerpoint/2010/main" val="827690388"/>
       </p:ext>
     </p:extLst>
   </p:cSld>
@@ -5163,116 +4914,6 @@
           <a:p>
             <a:r>
               <a:rPr lang="en-US" dirty="0" smtClean="0"/>
-              <a:t>Wrapping up</a:t>
-            </a:r>
-            <a:endParaRPr lang="en-US" dirty="0"/>
-          </a:p>
-        </p:txBody>
-      </p:sp>
-      <p:sp>
-        <p:nvSpPr>
-          <p:cNvPr id="3" name="Content Placeholder 2"/>
-          <p:cNvSpPr>
-            <a:spLocks noGrp="1"/>
-          </p:cNvSpPr>
-          <p:nvPr>
-            <p:ph idx="1"/>
-          </p:nvPr>
-        </p:nvSpPr>
-        <p:spPr/>
-        <p:txBody>
-          <a:bodyPr/>
-          <a:lstStyle/>
-          <a:p>
-            <a:r>
-              <a:rPr lang="en-US" dirty="0" smtClean="0"/>
-              <a:t>Really about investment strategies</a:t>
-            </a:r>
-            <a:endParaRPr lang="en-US" dirty="0"/>
-          </a:p>
-          <a:p>
-            <a:endParaRPr lang="en-US" sz="500" dirty="0"/>
-          </a:p>
-          <a:p>
-            <a:r>
-              <a:rPr lang="en-US" dirty="0" smtClean="0"/>
-              <a:t>All predictions involve risk</a:t>
-            </a:r>
-          </a:p>
-          <a:p>
-            <a:endParaRPr lang="en-US" sz="400" dirty="0"/>
-          </a:p>
-          <a:p>
-            <a:r>
-              <a:rPr lang="en-US" dirty="0" smtClean="0"/>
-              <a:t>Focus on a few that matter</a:t>
-            </a:r>
-          </a:p>
-          <a:p>
-            <a:endParaRPr lang="en-US" sz="600" dirty="0"/>
-          </a:p>
-          <a:p>
-            <a:r>
-              <a:rPr lang="en-US" dirty="0" smtClean="0"/>
-              <a:t>Collect data as you go, then course correct</a:t>
-            </a:r>
-          </a:p>
-        </p:txBody>
-      </p:sp>
-    </p:spTree>
-    <p:extLst>
-      <p:ext uri="{BB962C8B-B14F-4D97-AF65-F5344CB8AC3E}">
-        <p14:creationId xmlns:p14="http://schemas.microsoft.com/office/powerpoint/2010/main" val="827690388"/>
-      </p:ext>
-    </p:extLst>
-  </p:cSld>
-  <p:clrMapOvr>
-    <a:masterClrMapping/>
-  </p:clrMapOvr>
-  <p:timing>
-    <p:tnLst>
-      <p:par>
-        <p:cTn xmlns:p14="http://schemas.microsoft.com/office/powerpoint/2010/main" id="1" dur="indefinite" restart="never" nodeType="tmRoot"/>
-      </p:par>
-    </p:tnLst>
-  </p:timing>
-</p:sld>
-</file>
-
-<file path=ppt/slides/slide17.xml><?xml version="1.0" encoding="utf-8"?>
-<p:sld xmlns:a="http://schemas.openxmlformats.org/drawingml/2006/main" xmlns:r="http://schemas.openxmlformats.org/officeDocument/2006/relationships" xmlns:p="http://schemas.openxmlformats.org/presentationml/2006/main">
-  <p:cSld>
-    <p:spTree>
-      <p:nvGrpSpPr>
-        <p:cNvPr id="1" name=""/>
-        <p:cNvGrpSpPr/>
-        <p:nvPr/>
-      </p:nvGrpSpPr>
-      <p:grpSpPr>
-        <a:xfrm>
-          <a:off x="0" y="0"/>
-          <a:ext cx="0" cy="0"/>
-          <a:chOff x="0" y="0"/>
-          <a:chExt cx="0" cy="0"/>
-        </a:xfrm>
-      </p:grpSpPr>
-      <p:sp>
-        <p:nvSpPr>
-          <p:cNvPr id="2" name="Title 1"/>
-          <p:cNvSpPr>
-            <a:spLocks noGrp="1"/>
-          </p:cNvSpPr>
-          <p:nvPr>
-            <p:ph type="title"/>
-          </p:nvPr>
-        </p:nvSpPr>
-        <p:spPr/>
-        <p:txBody>
-          <a:bodyPr/>
-          <a:lstStyle/>
-          <a:p>
-            <a:r>
-              <a:rPr lang="en-US" dirty="0" smtClean="0"/>
               <a:t>fin</a:t>
             </a:r>
             <a:endParaRPr lang="en-US" dirty="0"/>
@@ -5367,7 +5008,6 @@
               <a:rPr lang="en-US" dirty="0"/>
               <a:t>/presentations</a:t>
             </a:r>
-            <a:endParaRPr lang="en-US" dirty="0"/>
           </a:p>
         </p:txBody>
       </p:sp>
@@ -6151,7 +5791,7 @@
           <a:p>
             <a:r>
               <a:rPr lang="en-US" dirty="0" smtClean="0"/>
-              <a:t>Predictions</a:t>
+              <a:t>Trends</a:t>
             </a:r>
             <a:endParaRPr lang="en-US" dirty="0"/>
           </a:p>
@@ -6230,11 +5870,7 @@
           <a:p>
             <a:r>
               <a:rPr lang="en-US" dirty="0" smtClean="0"/>
-              <a:t>AAA Game </a:t>
-            </a:r>
-            <a:r>
-              <a:rPr lang="en-US" dirty="0" smtClean="0"/>
-              <a:t>Development Risk</a:t>
+              <a:t>AAA Game Development Risk</a:t>
             </a:r>
             <a:endParaRPr lang="en-US" dirty="0"/>
           </a:p>
@@ -6324,134 +5960,6 @@
           <a:p>
             <a:r>
               <a:rPr lang="en-US" dirty="0" smtClean="0"/>
-              <a:t>GPU Compute </a:t>
-            </a:r>
-            <a:r>
-              <a:rPr lang="en-US" dirty="0" err="1" smtClean="0"/>
-              <a:t>vs</a:t>
-            </a:r>
-            <a:r>
-              <a:rPr lang="en-US" dirty="0" smtClean="0"/>
-              <a:t> Textures</a:t>
-            </a:r>
-            <a:endParaRPr lang="en-US" dirty="0"/>
-          </a:p>
-        </p:txBody>
-      </p:sp>
-      <p:pic>
-        <p:nvPicPr>
-          <p:cNvPr id="4" name="Picture 3" descr="Supercomputer.jpg"/>
-          <p:cNvPicPr>
-            <a:picLocks noChangeAspect="1"/>
-          </p:cNvPicPr>
-          <p:nvPr/>
-        </p:nvPicPr>
-        <p:blipFill>
-          <a:blip r:embed="rId2" cstate="screen">
-            <a:extLst>
-              <a:ext uri="{28A0092B-C50C-407E-A947-70E740481C1C}">
-                <a14:useLocalDpi xmlns:a14="http://schemas.microsoft.com/office/drawing/2010/main"/>
-              </a:ext>
-            </a:extLst>
-          </a:blip>
-          <a:stretch>
-            <a:fillRect/>
-          </a:stretch>
-        </p:blipFill>
-        <p:spPr>
-          <a:xfrm>
-            <a:off x="241904" y="1366761"/>
-            <a:ext cx="4481286" cy="2987524"/>
-          </a:xfrm>
-          <a:prstGeom prst="rect">
-            <a:avLst/>
-          </a:prstGeom>
-        </p:spPr>
-      </p:pic>
-      <p:pic>
-        <p:nvPicPr>
-          <p:cNvPr id="5" name="Picture 4" descr="1280px-1600x1200-texture-is2003.jpg"/>
-          <p:cNvPicPr>
-            <a:picLocks noChangeAspect="1"/>
-          </p:cNvPicPr>
-          <p:nvPr/>
-        </p:nvPicPr>
-        <p:blipFill>
-          <a:blip r:embed="rId3" cstate="screen">
-            <a:extLst>
-              <a:ext uri="{28A0092B-C50C-407E-A947-70E740481C1C}">
-                <a14:useLocalDpi xmlns:a14="http://schemas.microsoft.com/office/drawing/2010/main"/>
-              </a:ext>
-            </a:extLst>
-          </a:blip>
-          <a:stretch>
-            <a:fillRect/>
-          </a:stretch>
-        </p:blipFill>
-        <p:spPr>
-          <a:xfrm>
-            <a:off x="4924777" y="1366761"/>
-            <a:ext cx="3983366" cy="2987524"/>
-          </a:xfrm>
-          <a:prstGeom prst="rect">
-            <a:avLst/>
-          </a:prstGeom>
-        </p:spPr>
-      </p:pic>
-    </p:spTree>
-    <p:extLst>
-      <p:ext uri="{BB962C8B-B14F-4D97-AF65-F5344CB8AC3E}">
-        <p14:creationId xmlns:p14="http://schemas.microsoft.com/office/powerpoint/2010/main" val="941073808"/>
-      </p:ext>
-    </p:extLst>
-  </p:cSld>
-  <p:clrMapOvr>
-    <a:masterClrMapping/>
-  </p:clrMapOvr>
-  <p:timing>
-    <p:tnLst>
-      <p:par>
-        <p:cTn xmlns:p14="http://schemas.microsoft.com/office/powerpoint/2010/main" id="1" dur="indefinite" restart="never" nodeType="tmRoot"/>
-      </p:par>
-    </p:tnLst>
-  </p:timing>
-</p:sld>
-</file>
-
-<file path=ppt/slides/slide9.xml><?xml version="1.0" encoding="utf-8"?>
-<p:sld xmlns:a="http://schemas.openxmlformats.org/drawingml/2006/main" xmlns:r="http://schemas.openxmlformats.org/officeDocument/2006/relationships" xmlns:p="http://schemas.openxmlformats.org/presentationml/2006/main">
-  <p:cSld>
-    <p:spTree>
-      <p:nvGrpSpPr>
-        <p:cNvPr id="1" name=""/>
-        <p:cNvGrpSpPr/>
-        <p:nvPr/>
-      </p:nvGrpSpPr>
-      <p:grpSpPr>
-        <a:xfrm>
-          <a:off x="0" y="0"/>
-          <a:ext cx="0" cy="0"/>
-          <a:chOff x="0" y="0"/>
-          <a:chExt cx="0" cy="0"/>
-        </a:xfrm>
-      </p:grpSpPr>
-      <p:sp>
-        <p:nvSpPr>
-          <p:cNvPr id="2" name="Title 1"/>
-          <p:cNvSpPr>
-            <a:spLocks noGrp="1"/>
-          </p:cNvSpPr>
-          <p:nvPr>
-            <p:ph type="title"/>
-          </p:nvPr>
-        </p:nvSpPr>
-        <p:spPr/>
-        <p:txBody>
-          <a:bodyPr/>
-          <a:lstStyle/>
-          <a:p>
-            <a:r>
-              <a:rPr lang="en-US" dirty="0" smtClean="0"/>
               <a:t>Hardware</a:t>
             </a:r>
             <a:endParaRPr lang="en-US" dirty="0"/>
@@ -6501,7 +6009,19 @@
             </a:r>
             <a:r>
               <a:rPr lang="en-US" dirty="0" smtClean="0"/>
-              <a:t> – 50B devices by 2020</a:t>
+              <a:t> </a:t>
+            </a:r>
+            <a:r>
+              <a:rPr lang="en-US" dirty="0" smtClean="0"/>
+              <a:t>20B - </a:t>
+            </a:r>
+            <a:r>
+              <a:rPr lang="en-US" dirty="0" smtClean="0"/>
+              <a:t>50B by </a:t>
+            </a:r>
+            <a:r>
+              <a:rPr lang="en-US" dirty="0" smtClean="0"/>
+              <a:t>2020</a:t>
             </a:r>
           </a:p>
           <a:p>
@@ -6550,6 +6070,336 @@
     <p:extLst>
       <p:ext uri="{BB962C8B-B14F-4D97-AF65-F5344CB8AC3E}">
         <p14:creationId xmlns:p14="http://schemas.microsoft.com/office/powerpoint/2010/main" val="1501883760"/>
+      </p:ext>
+    </p:extLst>
+  </p:cSld>
+  <p:clrMapOvr>
+    <a:masterClrMapping/>
+  </p:clrMapOvr>
+  <p:timing>
+    <p:tnLst>
+      <p:par>
+        <p:cTn xmlns:p14="http://schemas.microsoft.com/office/powerpoint/2010/main" id="1" dur="indefinite" restart="never" nodeType="tmRoot"/>
+      </p:par>
+    </p:tnLst>
+  </p:timing>
+</p:sld>
+</file>
+
+<file path=ppt/slides/slide9.xml><?xml version="1.0" encoding="utf-8"?>
+<p:sld xmlns:a="http://schemas.openxmlformats.org/drawingml/2006/main" xmlns:r="http://schemas.openxmlformats.org/officeDocument/2006/relationships" xmlns:p="http://schemas.openxmlformats.org/presentationml/2006/main">
+  <p:cSld>
+    <p:spTree>
+      <p:nvGrpSpPr>
+        <p:cNvPr id="1" name=""/>
+        <p:cNvGrpSpPr/>
+        <p:nvPr/>
+      </p:nvGrpSpPr>
+      <p:grpSpPr>
+        <a:xfrm>
+          <a:off x="0" y="0"/>
+          <a:ext cx="0" cy="0"/>
+          <a:chOff x="0" y="0"/>
+          <a:chExt cx="0" cy="0"/>
+        </a:xfrm>
+      </p:grpSpPr>
+      <p:sp>
+        <p:nvSpPr>
+          <p:cNvPr id="2" name="Title 1"/>
+          <p:cNvSpPr>
+            <a:spLocks noGrp="1"/>
+          </p:cNvSpPr>
+          <p:nvPr>
+            <p:ph type="title"/>
+          </p:nvPr>
+        </p:nvSpPr>
+        <p:spPr/>
+        <p:txBody>
+          <a:bodyPr/>
+          <a:lstStyle/>
+          <a:p>
+            <a:r>
+              <a:rPr lang="en-US" dirty="0" smtClean="0"/>
+              <a:t>Customer Segmentation</a:t>
+            </a:r>
+            <a:endParaRPr lang="en-US" dirty="0"/>
+          </a:p>
+        </p:txBody>
+      </p:sp>
+      <p:graphicFrame>
+        <p:nvGraphicFramePr>
+          <p:cNvPr id="4" name="Content Placeholder 3"/>
+          <p:cNvGraphicFramePr>
+            <a:graphicFrameLocks noGrp="1"/>
+          </p:cNvGraphicFramePr>
+          <p:nvPr>
+            <p:ph idx="1"/>
+            <p:extLst>
+              <p:ext uri="{D42A27DB-BD31-4B8C-83A1-F6EECF244321}">
+                <p14:modId xmlns:p14="http://schemas.microsoft.com/office/powerpoint/2010/main" val="1772609956"/>
+              </p:ext>
+            </p:extLst>
+          </p:nvPr>
+        </p:nvGraphicFramePr>
+        <p:xfrm>
+          <a:off x="457200" y="1200148"/>
+          <a:ext cx="8229600" cy="3483681"/>
+        </p:xfrm>
+        <a:graphic>
+          <a:graphicData uri="http://schemas.openxmlformats.org/drawingml/2006/table">
+            <a:tbl>
+              <a:tblPr firstRow="1" bandRow="1">
+                <a:tableStyleId>{5C22544A-7EE6-4342-B048-85BDC9FD1C3A}</a:tableStyleId>
+              </a:tblPr>
+              <a:tblGrid>
+                <a:gridCol w="2743200"/>
+                <a:gridCol w="2743200"/>
+                <a:gridCol w="2743200"/>
+              </a:tblGrid>
+              <a:tr h="1101761">
+                <a:tc>
+                  <a:txBody>
+                    <a:bodyPr/>
+                    <a:lstStyle/>
+                    <a:p>
+                      <a:r>
+                        <a:rPr lang="en-US" sz="2400" dirty="0" smtClean="0"/>
+                        <a:t>Price Insensitive</a:t>
+                      </a:r>
+                      <a:endParaRPr lang="en-US" sz="2400" baseline="0" dirty="0" smtClean="0"/>
+                    </a:p>
+                    <a:p>
+                      <a:r>
+                        <a:rPr lang="en-US" baseline="0" dirty="0" smtClean="0"/>
+                        <a:t>AAA Gamer</a:t>
+                      </a:r>
+                      <a:endParaRPr lang="en-US" dirty="0"/>
+                    </a:p>
+                  </a:txBody>
+                  <a:tcPr/>
+                </a:tc>
+                <a:tc>
+                  <a:txBody>
+                    <a:bodyPr/>
+                    <a:lstStyle/>
+                    <a:p>
+                      <a:r>
+                        <a:rPr lang="en-US" sz="2400" baseline="0" dirty="0" smtClean="0"/>
+                        <a:t>Hardware: +$2000</a:t>
+                      </a:r>
+                    </a:p>
+                    <a:p>
+                      <a:r>
+                        <a:rPr lang="en-US" baseline="0" dirty="0" smtClean="0"/>
+                        <a:t>Hi wattage video cards</a:t>
+                      </a:r>
+                    </a:p>
+                    <a:p>
+                      <a:r>
+                        <a:rPr lang="en-US" baseline="0" dirty="0" smtClean="0"/>
+                        <a:t>Hi cost gaming computer</a:t>
+                      </a:r>
+                      <a:endParaRPr lang="en-US" dirty="0"/>
+                    </a:p>
+                  </a:txBody>
+                  <a:tcPr/>
+                </a:tc>
+                <a:tc>
+                  <a:txBody>
+                    <a:bodyPr/>
+                    <a:lstStyle/>
+                    <a:p>
+                      <a:r>
+                        <a:rPr lang="en-US" sz="2400" dirty="0" smtClean="0"/>
+                        <a:t>Games: $50+</a:t>
+                      </a:r>
+                      <a:endParaRPr lang="en-US" sz="2400" baseline="0" dirty="0" smtClean="0"/>
+                    </a:p>
+                    <a:p>
+                      <a:r>
+                        <a:rPr lang="en-US" baseline="0" dirty="0" smtClean="0"/>
+                        <a:t>Best graphical fidelity</a:t>
+                      </a:r>
+                    </a:p>
+                    <a:p>
+                      <a:r>
+                        <a:rPr lang="en-US" baseline="0" dirty="0" smtClean="0"/>
+                        <a:t>100s to choose from</a:t>
+                      </a:r>
+                      <a:endParaRPr lang="en-US" dirty="0"/>
+                    </a:p>
+                  </a:txBody>
+                  <a:tcPr/>
+                </a:tc>
+              </a:tr>
+              <a:tr h="1101761">
+                <a:tc>
+                  <a:txBody>
+                    <a:bodyPr/>
+                    <a:lstStyle/>
+                    <a:p>
+                      <a:r>
+                        <a:rPr lang="en-US" sz="2400" dirty="0" smtClean="0"/>
+                        <a:t>Price Sensitive</a:t>
+                      </a:r>
+                    </a:p>
+                    <a:p>
+                      <a:r>
+                        <a:rPr lang="en-US" dirty="0" smtClean="0"/>
+                        <a:t>AAA</a:t>
+                      </a:r>
+                      <a:r>
+                        <a:rPr lang="en-US" baseline="0" dirty="0" smtClean="0"/>
+                        <a:t> Gamer</a:t>
+                      </a:r>
+                      <a:endParaRPr lang="en-US" dirty="0"/>
+                    </a:p>
+                  </a:txBody>
+                  <a:tcPr/>
+                </a:tc>
+                <a:tc>
+                  <a:txBody>
+                    <a:bodyPr/>
+                    <a:lstStyle/>
+                    <a:p>
+                      <a:r>
+                        <a:rPr lang="en-US" sz="2400" dirty="0" smtClean="0"/>
+                        <a:t>Hardware: ~$300</a:t>
+                      </a:r>
+                      <a:endParaRPr lang="en-US" sz="1800" dirty="0" smtClean="0"/>
+                    </a:p>
+                    <a:p>
+                      <a:r>
+                        <a:rPr lang="en-US" sz="1800" dirty="0" smtClean="0"/>
+                        <a:t>Power constrained package</a:t>
+                      </a:r>
+                    </a:p>
+                    <a:p>
+                      <a:r>
+                        <a:rPr lang="en-US" sz="1800" dirty="0" smtClean="0"/>
+                        <a:t>Low cost console</a:t>
+                      </a:r>
+                      <a:endParaRPr lang="en-US" sz="2400" dirty="0" smtClean="0"/>
+                    </a:p>
+                  </a:txBody>
+                  <a:tcPr/>
+                </a:tc>
+                <a:tc>
+                  <a:txBody>
+                    <a:bodyPr/>
+                    <a:lstStyle/>
+                    <a:p>
+                      <a:r>
+                        <a:rPr lang="en-US" sz="2400" dirty="0" smtClean="0"/>
+                        <a:t>Games: $50+</a:t>
+                      </a:r>
+                    </a:p>
+                    <a:p>
+                      <a:r>
+                        <a:rPr lang="en-US" dirty="0" smtClean="0"/>
+                        <a:t>Good</a:t>
+                      </a:r>
+                      <a:r>
+                        <a:rPr lang="en-US" baseline="0" dirty="0" smtClean="0"/>
+                        <a:t> graphical fidelity</a:t>
+                      </a:r>
+                    </a:p>
+                    <a:p>
+                      <a:r>
+                        <a:rPr lang="en-US" baseline="0" dirty="0" smtClean="0"/>
+                        <a:t>100s to choose from</a:t>
+                      </a:r>
+                      <a:endParaRPr lang="en-US" dirty="0"/>
+                    </a:p>
+                  </a:txBody>
+                  <a:tcPr/>
+                </a:tc>
+              </a:tr>
+              <a:tr h="1101761">
+                <a:tc>
+                  <a:txBody>
+                    <a:bodyPr/>
+                    <a:lstStyle/>
+                    <a:p>
+                      <a:r>
+                        <a:rPr lang="en-US" sz="2800" dirty="0" smtClean="0"/>
+                        <a:t>Mobile Gamer</a:t>
+                      </a:r>
+                    </a:p>
+                    <a:p>
+                      <a:r>
+                        <a:rPr lang="en-US" dirty="0" smtClean="0"/>
+                        <a:t>Social, casual, innovative</a:t>
+                      </a:r>
+                      <a:endParaRPr lang="en-US" dirty="0"/>
+                    </a:p>
+                  </a:txBody>
+                  <a:tcPr/>
+                </a:tc>
+                <a:tc>
+                  <a:txBody>
+                    <a:bodyPr/>
+                    <a:lstStyle/>
+                    <a:p>
+                      <a:r>
+                        <a:rPr lang="en-US" sz="2400" dirty="0" smtClean="0"/>
+                        <a:t>Hardware: $0 - $800</a:t>
+                      </a:r>
+                    </a:p>
+                    <a:p>
+                      <a:r>
+                        <a:rPr lang="en-US" dirty="0" smtClean="0"/>
+                        <a:t>Low power devices</a:t>
+                      </a:r>
+                    </a:p>
+                    <a:p>
+                      <a:r>
+                        <a:rPr lang="en-US" baseline="0" dirty="0" smtClean="0"/>
+                        <a:t>Prices run low to middle</a:t>
+                      </a:r>
+                      <a:endParaRPr lang="en-US" dirty="0"/>
+                    </a:p>
+                  </a:txBody>
+                  <a:tcPr/>
+                </a:tc>
+                <a:tc>
+                  <a:txBody>
+                    <a:bodyPr/>
+                    <a:lstStyle/>
+                    <a:p>
+                      <a:r>
+                        <a:rPr lang="en-US" sz="2400" dirty="0" smtClean="0"/>
+                        <a:t>Games: $0</a:t>
+                      </a:r>
+                      <a:r>
+                        <a:rPr lang="en-US" sz="2400" baseline="0" dirty="0" smtClean="0"/>
+                        <a:t> - $5</a:t>
+                      </a:r>
+                    </a:p>
+                    <a:p>
+                      <a:r>
+                        <a:rPr lang="en-US" baseline="0" dirty="0" smtClean="0"/>
+                        <a:t>Wants fun, innovation, but not willing to pay much</a:t>
+                      </a:r>
+                    </a:p>
+                    <a:p>
+                      <a:r>
+                        <a:rPr lang="en-US" baseline="0" dirty="0" smtClean="0"/>
+                        <a:t>1000s to choose from</a:t>
+                      </a:r>
+                    </a:p>
+                  </a:txBody>
+                  <a:tcPr/>
+                </a:tc>
+              </a:tr>
+            </a:tbl>
+          </a:graphicData>
+        </a:graphic>
+      </p:graphicFrame>
+    </p:spTree>
+    <p:extLst>
+      <p:ext uri="{BB962C8B-B14F-4D97-AF65-F5344CB8AC3E}">
+        <p14:creationId xmlns:p14="http://schemas.microsoft.com/office/powerpoint/2010/main" val="2301412250"/>
       </p:ext>
     </p:extLst>
   </p:cSld>

</xml_diff>